<commit_message>
Update Project ppt - Priyanka Kolhe.pptx
</commit_message>
<xml_diff>
--- a/Project Doc/Project ppt - Priyanka Kolhe.pptx
+++ b/Project Doc/Project ppt - Priyanka Kolhe.pptx
@@ -145,6 +145,38 @@
 <file path=ppt/changesInfos/changesInfo1.xml><?xml version="1.0" encoding="utf-8"?>
 <pc:chgInfo xmlns:a="http://schemas.openxmlformats.org/drawingml/2006/main" xmlns:r="http://schemas.openxmlformats.org/officeDocument/2006/relationships" xmlns:ac="http://schemas.microsoft.com/office/drawing/2013/main/command" xmlns:pc="http://schemas.microsoft.com/office/powerpoint/2013/main/command">
   <pc:docChgLst>
+    <pc:chgData name="Bhushan Kolhe" userId="7436f0978ebcbfe7" providerId="LiveId" clId="{A18AE52F-5D5A-488C-8F11-1BEDBE0FCBA4}"/>
+    <pc:docChg chg="custSel modSld">
+      <pc:chgData name="Bhushan Kolhe" userId="7436f0978ebcbfe7" providerId="LiveId" clId="{A18AE52F-5D5A-488C-8F11-1BEDBE0FCBA4}" dt="2024-01-19T06:45:35.975" v="3" actId="14100"/>
+      <pc:docMkLst>
+        <pc:docMk/>
+      </pc:docMkLst>
+      <pc:sldChg chg="addSp delSp modSp mod">
+        <pc:chgData name="Bhushan Kolhe" userId="7436f0978ebcbfe7" providerId="LiveId" clId="{A18AE52F-5D5A-488C-8F11-1BEDBE0FCBA4}" dt="2024-01-19T06:45:35.975" v="3" actId="14100"/>
+        <pc:sldMkLst>
+          <pc:docMk/>
+          <pc:sldMk cId="1833194787" sldId="273"/>
+        </pc:sldMkLst>
+        <pc:picChg chg="add mod">
+          <ac:chgData name="Bhushan Kolhe" userId="7436f0978ebcbfe7" providerId="LiveId" clId="{A18AE52F-5D5A-488C-8F11-1BEDBE0FCBA4}" dt="2024-01-19T06:45:35.975" v="3" actId="14100"/>
+          <ac:picMkLst>
+            <pc:docMk/>
+            <pc:sldMk cId="1833194787" sldId="273"/>
+            <ac:picMk id="5" creationId="{DEEEEA27-3DAC-ACBE-E116-87DB43C8FE16}"/>
+          </ac:picMkLst>
+        </pc:picChg>
+        <pc:picChg chg="del">
+          <ac:chgData name="Bhushan Kolhe" userId="7436f0978ebcbfe7" providerId="LiveId" clId="{A18AE52F-5D5A-488C-8F11-1BEDBE0FCBA4}" dt="2024-01-19T06:45:27.326" v="0" actId="478"/>
+          <ac:picMkLst>
+            <pc:docMk/>
+            <pc:sldMk cId="1833194787" sldId="273"/>
+            <ac:picMk id="7" creationId="{043AD7E5-06B1-B82B-7872-967F723106F7}"/>
+          </ac:picMkLst>
+        </pc:picChg>
+      </pc:sldChg>
+    </pc:docChg>
+  </pc:docChgLst>
+  <pc:docChgLst>
     <pc:chgData name="Bhushan Kolhe" userId="7436f0978ebcbfe7" providerId="LiveId" clId="{45FD06AC-A271-4B41-B965-66C29686E20F}"/>
     <pc:docChg chg="undo custSel modSld">
       <pc:chgData name="Bhushan Kolhe" userId="7436f0978ebcbfe7" providerId="LiveId" clId="{45FD06AC-A271-4B41-B965-66C29686E20F}" dt="2024-01-05T09:10:57.555" v="8" actId="113"/>
@@ -263,6 +295,279 @@
             <ac:spMk id="11" creationId="{BB407EF5-5B04-BA34-7ADC-8B50E55C40A2}"/>
           </ac:spMkLst>
         </pc:spChg>
+      </pc:sldChg>
+    </pc:docChg>
+  </pc:docChgLst>
+  <pc:docChgLst>
+    <pc:chgData name="Bhushan Kolhe" userId="7436f0978ebcbfe7" providerId="LiveId" clId="{9082A401-8788-4009-A940-751ED403E6D2}"/>
+    <pc:docChg chg="undo custSel modSld">
+      <pc:chgData name="Bhushan Kolhe" userId="7436f0978ebcbfe7" providerId="LiveId" clId="{9082A401-8788-4009-A940-751ED403E6D2}" dt="2024-01-05T05:09:43.962" v="121" actId="14100"/>
+      <pc:docMkLst>
+        <pc:docMk/>
+      </pc:docMkLst>
+      <pc:sldChg chg="modSp mod">
+        <pc:chgData name="Bhushan Kolhe" userId="7436f0978ebcbfe7" providerId="LiveId" clId="{9082A401-8788-4009-A940-751ED403E6D2}" dt="2024-01-05T05:09:43.962" v="121" actId="14100"/>
+        <pc:sldMkLst>
+          <pc:docMk/>
+          <pc:sldMk cId="3842410494" sldId="258"/>
+        </pc:sldMkLst>
+        <pc:spChg chg="mod">
+          <ac:chgData name="Bhushan Kolhe" userId="7436f0978ebcbfe7" providerId="LiveId" clId="{9082A401-8788-4009-A940-751ED403E6D2}" dt="2024-01-05T05:09:43.962" v="121" actId="14100"/>
+          <ac:spMkLst>
+            <pc:docMk/>
+            <pc:sldMk cId="3842410494" sldId="258"/>
+            <ac:spMk id="7" creationId="{BB407EF5-5B04-BA34-7ADC-8B50E55C40A2}"/>
+          </ac:spMkLst>
+        </pc:spChg>
+      </pc:sldChg>
+      <pc:sldChg chg="addSp delSp modSp mod">
+        <pc:chgData name="Bhushan Kolhe" userId="7436f0978ebcbfe7" providerId="LiveId" clId="{9082A401-8788-4009-A940-751ED403E6D2}" dt="2024-01-05T05:08:48.213" v="120" actId="14100"/>
+        <pc:sldMkLst>
+          <pc:docMk/>
+          <pc:sldMk cId="4238390595" sldId="269"/>
+        </pc:sldMkLst>
+        <pc:spChg chg="add mod ord">
+          <ac:chgData name="Bhushan Kolhe" userId="7436f0978ebcbfe7" providerId="LiveId" clId="{9082A401-8788-4009-A940-751ED403E6D2}" dt="2024-01-05T05:08:22.323" v="114" actId="14100"/>
+          <ac:spMkLst>
+            <pc:docMk/>
+            <pc:sldMk cId="4238390595" sldId="269"/>
+            <ac:spMk id="2" creationId="{D21A3C8B-C2F5-C8C6-A305-9664F4313B05}"/>
+          </ac:spMkLst>
+        </pc:spChg>
+        <pc:spChg chg="mod ord">
+          <ac:chgData name="Bhushan Kolhe" userId="7436f0978ebcbfe7" providerId="LiveId" clId="{9082A401-8788-4009-A940-751ED403E6D2}" dt="2024-01-05T05:07:48.329" v="109" actId="465"/>
+          <ac:spMkLst>
+            <pc:docMk/>
+            <pc:sldMk cId="4238390595" sldId="269"/>
+            <ac:spMk id="3" creationId="{65ED055F-9699-9EC4-C2E8-2608924F4B0A}"/>
+          </ac:spMkLst>
+        </pc:spChg>
+        <pc:spChg chg="mod">
+          <ac:chgData name="Bhushan Kolhe" userId="7436f0978ebcbfe7" providerId="LiveId" clId="{9082A401-8788-4009-A940-751ED403E6D2}" dt="2024-01-05T05:07:44.457" v="108" actId="552"/>
+          <ac:spMkLst>
+            <pc:docMk/>
+            <pc:sldMk cId="4238390595" sldId="269"/>
+            <ac:spMk id="4" creationId="{3B1ACA4C-CE50-A8C7-6B2F-77B674DEE881}"/>
+          </ac:spMkLst>
+        </pc:spChg>
+        <pc:picChg chg="add del mod">
+          <ac:chgData name="Bhushan Kolhe" userId="7436f0978ebcbfe7" providerId="LiveId" clId="{9082A401-8788-4009-A940-751ED403E6D2}" dt="2024-01-05T04:56:48.563" v="2" actId="478"/>
+          <ac:picMkLst>
+            <pc:docMk/>
+            <pc:sldMk cId="4238390595" sldId="269"/>
+            <ac:picMk id="1026" creationId="{2F8B5B2F-94B5-BE5A-B8ED-7E910C1723FE}"/>
+          </ac:picMkLst>
+        </pc:picChg>
+        <pc:picChg chg="add mod">
+          <ac:chgData name="Bhushan Kolhe" userId="7436f0978ebcbfe7" providerId="LiveId" clId="{9082A401-8788-4009-A940-751ED403E6D2}" dt="2024-01-05T05:08:48.213" v="120" actId="14100"/>
+          <ac:picMkLst>
+            <pc:docMk/>
+            <pc:sldMk cId="4238390595" sldId="269"/>
+            <ac:picMk id="1028" creationId="{A0EF93C9-347D-B866-F8E8-7A8BBB516476}"/>
+          </ac:picMkLst>
+        </pc:picChg>
+      </pc:sldChg>
+    </pc:docChg>
+  </pc:docChgLst>
+  <pc:docChgLst>
+    <pc:chgData name="Bhushan Kolhe" userId="7436f0978ebcbfe7" providerId="LiveId" clId="{BD41A79C-C1D0-44EA-BE0B-5EFDCBA1CF78}"/>
+    <pc:docChg chg="undo custSel addSld modSld">
+      <pc:chgData name="Bhushan Kolhe" userId="7436f0978ebcbfe7" providerId="LiveId" clId="{BD41A79C-C1D0-44EA-BE0B-5EFDCBA1CF78}" dt="2024-01-05T08:19:56.231" v="311" actId="5793"/>
+      <pc:docMkLst>
+        <pc:docMk/>
+      </pc:docMkLst>
+      <pc:sldChg chg="modSp mod">
+        <pc:chgData name="Bhushan Kolhe" userId="7436f0978ebcbfe7" providerId="LiveId" clId="{BD41A79C-C1D0-44EA-BE0B-5EFDCBA1CF78}" dt="2024-01-05T08:16:54.047" v="273" actId="20577"/>
+        <pc:sldMkLst>
+          <pc:docMk/>
+          <pc:sldMk cId="2852237901" sldId="264"/>
+        </pc:sldMkLst>
+        <pc:spChg chg="mod">
+          <ac:chgData name="Bhushan Kolhe" userId="7436f0978ebcbfe7" providerId="LiveId" clId="{BD41A79C-C1D0-44EA-BE0B-5EFDCBA1CF78}" dt="2024-01-05T08:16:54.047" v="273" actId="20577"/>
+          <ac:spMkLst>
+            <pc:docMk/>
+            <pc:sldMk cId="2852237901" sldId="264"/>
+            <ac:spMk id="6" creationId="{19F7FF01-6754-BD8F-10DA-ADA7299F5369}"/>
+          </ac:spMkLst>
+        </pc:spChg>
+      </pc:sldChg>
+      <pc:sldChg chg="modSp mod">
+        <pc:chgData name="Bhushan Kolhe" userId="7436f0978ebcbfe7" providerId="LiveId" clId="{BD41A79C-C1D0-44EA-BE0B-5EFDCBA1CF78}" dt="2024-01-05T08:16:59.521" v="282" actId="20577"/>
+        <pc:sldMkLst>
+          <pc:docMk/>
+          <pc:sldMk cId="941089417" sldId="265"/>
+        </pc:sldMkLst>
+        <pc:spChg chg="mod">
+          <ac:chgData name="Bhushan Kolhe" userId="7436f0978ebcbfe7" providerId="LiveId" clId="{BD41A79C-C1D0-44EA-BE0B-5EFDCBA1CF78}" dt="2024-01-05T08:16:59.521" v="282" actId="20577"/>
+          <ac:spMkLst>
+            <pc:docMk/>
+            <pc:sldMk cId="941089417" sldId="265"/>
+            <ac:spMk id="6" creationId="{19F7FF01-6754-BD8F-10DA-ADA7299F5369}"/>
+          </ac:spMkLst>
+        </pc:spChg>
+      </pc:sldChg>
+      <pc:sldChg chg="modSp mod">
+        <pc:chgData name="Bhushan Kolhe" userId="7436f0978ebcbfe7" providerId="LiveId" clId="{BD41A79C-C1D0-44EA-BE0B-5EFDCBA1CF78}" dt="2024-01-05T08:16:25.725" v="264" actId="20577"/>
+        <pc:sldMkLst>
+          <pc:docMk/>
+          <pc:sldMk cId="737767209" sldId="268"/>
+        </pc:sldMkLst>
+        <pc:spChg chg="mod">
+          <ac:chgData name="Bhushan Kolhe" userId="7436f0978ebcbfe7" providerId="LiveId" clId="{BD41A79C-C1D0-44EA-BE0B-5EFDCBA1CF78}" dt="2024-01-05T08:16:25.725" v="264" actId="20577"/>
+          <ac:spMkLst>
+            <pc:docMk/>
+            <pc:sldMk cId="737767209" sldId="268"/>
+            <ac:spMk id="6" creationId="{19F7FF01-6754-BD8F-10DA-ADA7299F5369}"/>
+          </ac:spMkLst>
+        </pc:spChg>
+      </pc:sldChg>
+      <pc:sldChg chg="modSp mod">
+        <pc:chgData name="Bhushan Kolhe" userId="7436f0978ebcbfe7" providerId="LiveId" clId="{BD41A79C-C1D0-44EA-BE0B-5EFDCBA1CF78}" dt="2024-01-05T07:45:51.884" v="1" actId="113"/>
+        <pc:sldMkLst>
+          <pc:docMk/>
+          <pc:sldMk cId="4238390595" sldId="269"/>
+        </pc:sldMkLst>
+        <pc:spChg chg="mod">
+          <ac:chgData name="Bhushan Kolhe" userId="7436f0978ebcbfe7" providerId="LiveId" clId="{BD41A79C-C1D0-44EA-BE0B-5EFDCBA1CF78}" dt="2024-01-05T07:45:51.884" v="1" actId="113"/>
+          <ac:spMkLst>
+            <pc:docMk/>
+            <pc:sldMk cId="4238390595" sldId="269"/>
+            <ac:spMk id="4" creationId="{3B1ACA4C-CE50-A8C7-6B2F-77B674DEE881}"/>
+          </ac:spMkLst>
+        </pc:spChg>
+      </pc:sldChg>
+      <pc:sldChg chg="modSp mod">
+        <pc:chgData name="Bhushan Kolhe" userId="7436f0978ebcbfe7" providerId="LiveId" clId="{BD41A79C-C1D0-44EA-BE0B-5EFDCBA1CF78}" dt="2024-01-05T08:15:29.868" v="241" actId="20577"/>
+        <pc:sldMkLst>
+          <pc:docMk/>
+          <pc:sldMk cId="2938684696" sldId="272"/>
+        </pc:sldMkLst>
+        <pc:spChg chg="mod">
+          <ac:chgData name="Bhushan Kolhe" userId="7436f0978ebcbfe7" providerId="LiveId" clId="{BD41A79C-C1D0-44EA-BE0B-5EFDCBA1CF78}" dt="2024-01-05T08:15:29.868" v="241" actId="20577"/>
+          <ac:spMkLst>
+            <pc:docMk/>
+            <pc:sldMk cId="2938684696" sldId="272"/>
+            <ac:spMk id="6" creationId="{19F7FF01-6754-BD8F-10DA-ADA7299F5369}"/>
+          </ac:spMkLst>
+        </pc:spChg>
+      </pc:sldChg>
+      <pc:sldChg chg="addSp delSp modSp mod">
+        <pc:chgData name="Bhushan Kolhe" userId="7436f0978ebcbfe7" providerId="LiveId" clId="{BD41A79C-C1D0-44EA-BE0B-5EFDCBA1CF78}" dt="2024-01-05T08:19:01.926" v="309" actId="1076"/>
+        <pc:sldMkLst>
+          <pc:docMk/>
+          <pc:sldMk cId="1833194787" sldId="273"/>
+        </pc:sldMkLst>
+        <pc:spChg chg="mod">
+          <ac:chgData name="Bhushan Kolhe" userId="7436f0978ebcbfe7" providerId="LiveId" clId="{BD41A79C-C1D0-44EA-BE0B-5EFDCBA1CF78}" dt="2024-01-05T08:17:16.804" v="300" actId="20577"/>
+          <ac:spMkLst>
+            <pc:docMk/>
+            <pc:sldMk cId="1833194787" sldId="273"/>
+            <ac:spMk id="6" creationId="{19F7FF01-6754-BD8F-10DA-ADA7299F5369}"/>
+          </ac:spMkLst>
+        </pc:spChg>
+        <pc:spChg chg="mod">
+          <ac:chgData name="Bhushan Kolhe" userId="7436f0978ebcbfe7" providerId="LiveId" clId="{BD41A79C-C1D0-44EA-BE0B-5EFDCBA1CF78}" dt="2024-01-05T08:18:57.847" v="308" actId="1076"/>
+          <ac:spMkLst>
+            <pc:docMk/>
+            <pc:sldMk cId="1833194787" sldId="273"/>
+            <ac:spMk id="11" creationId="{BB407EF5-5B04-BA34-7ADC-8B50E55C40A2}"/>
+          </ac:spMkLst>
+        </pc:spChg>
+        <pc:picChg chg="del mod">
+          <ac:chgData name="Bhushan Kolhe" userId="7436f0978ebcbfe7" providerId="LiveId" clId="{BD41A79C-C1D0-44EA-BE0B-5EFDCBA1CF78}" dt="2024-01-05T08:18:30.074" v="301" actId="478"/>
+          <ac:picMkLst>
+            <pc:docMk/>
+            <pc:sldMk cId="1833194787" sldId="273"/>
+            <ac:picMk id="2" creationId="{45CA5A49-09E2-4213-1ADE-DFD54F65DB12}"/>
+          </ac:picMkLst>
+        </pc:picChg>
+        <pc:picChg chg="add mod">
+          <ac:chgData name="Bhushan Kolhe" userId="7436f0978ebcbfe7" providerId="LiveId" clId="{BD41A79C-C1D0-44EA-BE0B-5EFDCBA1CF78}" dt="2024-01-05T07:53:34.084" v="62" actId="1076"/>
+          <ac:picMkLst>
+            <pc:docMk/>
+            <pc:sldMk cId="1833194787" sldId="273"/>
+            <ac:picMk id="3" creationId="{BA0103DE-AF4B-98C6-68BE-9D7E38546A04}"/>
+          </ac:picMkLst>
+        </pc:picChg>
+        <pc:picChg chg="add mod">
+          <ac:chgData name="Bhushan Kolhe" userId="7436f0978ebcbfe7" providerId="LiveId" clId="{BD41A79C-C1D0-44EA-BE0B-5EFDCBA1CF78}" dt="2024-01-05T07:54:08.489" v="65" actId="1076"/>
+          <ac:picMkLst>
+            <pc:docMk/>
+            <pc:sldMk cId="1833194787" sldId="273"/>
+            <ac:picMk id="4" creationId="{A4A04E26-1C2A-E616-E079-5DBD051C6B89}"/>
+          </ac:picMkLst>
+        </pc:picChg>
+        <pc:picChg chg="add mod">
+          <ac:chgData name="Bhushan Kolhe" userId="7436f0978ebcbfe7" providerId="LiveId" clId="{BD41A79C-C1D0-44EA-BE0B-5EFDCBA1CF78}" dt="2024-01-05T08:19:01.926" v="309" actId="1076"/>
+          <ac:picMkLst>
+            <pc:docMk/>
+            <pc:sldMk cId="1833194787" sldId="273"/>
+            <ac:picMk id="7" creationId="{043AD7E5-06B1-B82B-7872-967F723106F7}"/>
+          </ac:picMkLst>
+        </pc:picChg>
+      </pc:sldChg>
+      <pc:sldChg chg="addSp delSp modSp add mod">
+        <pc:chgData name="Bhushan Kolhe" userId="7436f0978ebcbfe7" providerId="LiveId" clId="{BD41A79C-C1D0-44EA-BE0B-5EFDCBA1CF78}" dt="2024-01-05T08:19:56.231" v="311" actId="5793"/>
+        <pc:sldMkLst>
+          <pc:docMk/>
+          <pc:sldMk cId="3102868661" sldId="275"/>
+        </pc:sldMkLst>
+        <pc:spChg chg="add mod">
+          <ac:chgData name="Bhushan Kolhe" userId="7436f0978ebcbfe7" providerId="LiveId" clId="{BD41A79C-C1D0-44EA-BE0B-5EFDCBA1CF78}" dt="2024-01-05T08:14:45.763" v="231" actId="1076"/>
+          <ac:spMkLst>
+            <pc:docMk/>
+            <pc:sldMk cId="3102868661" sldId="275"/>
+            <ac:spMk id="5" creationId="{31192407-AC2C-C236-A138-BED7F6A836FA}"/>
+          </ac:spMkLst>
+        </pc:spChg>
+        <pc:spChg chg="mod">
+          <ac:chgData name="Bhushan Kolhe" userId="7436f0978ebcbfe7" providerId="LiveId" clId="{BD41A79C-C1D0-44EA-BE0B-5EFDCBA1CF78}" dt="2024-01-05T08:11:19.712" v="206" actId="20577"/>
+          <ac:spMkLst>
+            <pc:docMk/>
+            <pc:sldMk cId="3102868661" sldId="275"/>
+            <ac:spMk id="6" creationId="{19F7FF01-6754-BD8F-10DA-ADA7299F5369}"/>
+          </ac:spMkLst>
+        </pc:spChg>
+        <pc:spChg chg="add mod">
+          <ac:chgData name="Bhushan Kolhe" userId="7436f0978ebcbfe7" providerId="LiveId" clId="{BD41A79C-C1D0-44EA-BE0B-5EFDCBA1CF78}" dt="2024-01-05T08:19:56.231" v="311" actId="5793"/>
+          <ac:spMkLst>
+            <pc:docMk/>
+            <pc:sldMk cId="3102868661" sldId="275"/>
+            <ac:spMk id="7" creationId="{6EDDA372-85D3-026F-75D7-F0C7B0519F83}"/>
+          </ac:spMkLst>
+        </pc:spChg>
+        <pc:spChg chg="mod">
+          <ac:chgData name="Bhushan Kolhe" userId="7436f0978ebcbfe7" providerId="LiveId" clId="{BD41A79C-C1D0-44EA-BE0B-5EFDCBA1CF78}" dt="2024-01-05T08:03:18.914" v="112" actId="14100"/>
+          <ac:spMkLst>
+            <pc:docMk/>
+            <pc:sldMk cId="3102868661" sldId="275"/>
+            <ac:spMk id="11" creationId="{BB407EF5-5B04-BA34-7ADC-8B50E55C40A2}"/>
+          </ac:spMkLst>
+        </pc:spChg>
+        <pc:picChg chg="del">
+          <ac:chgData name="Bhushan Kolhe" userId="7436f0978ebcbfe7" providerId="LiveId" clId="{BD41A79C-C1D0-44EA-BE0B-5EFDCBA1CF78}" dt="2024-01-05T07:56:04.746" v="68" actId="478"/>
+          <ac:picMkLst>
+            <pc:docMk/>
+            <pc:sldMk cId="3102868661" sldId="275"/>
+            <ac:picMk id="2" creationId="{45CA5A49-09E2-4213-1ADE-DFD54F65DB12}"/>
+          </ac:picMkLst>
+        </pc:picChg>
+        <pc:picChg chg="del">
+          <ac:chgData name="Bhushan Kolhe" userId="7436f0978ebcbfe7" providerId="LiveId" clId="{BD41A79C-C1D0-44EA-BE0B-5EFDCBA1CF78}" dt="2024-01-05T07:56:05.506" v="69" actId="478"/>
+          <ac:picMkLst>
+            <pc:docMk/>
+            <pc:sldMk cId="3102868661" sldId="275"/>
+            <ac:picMk id="3" creationId="{BA0103DE-AF4B-98C6-68BE-9D7E38546A04}"/>
+          </ac:picMkLst>
+        </pc:picChg>
+        <pc:picChg chg="del">
+          <ac:chgData name="Bhushan Kolhe" userId="7436f0978ebcbfe7" providerId="LiveId" clId="{BD41A79C-C1D0-44EA-BE0B-5EFDCBA1CF78}" dt="2024-01-05T07:56:06.573" v="70" actId="478"/>
+          <ac:picMkLst>
+            <pc:docMk/>
+            <pc:sldMk cId="3102868661" sldId="275"/>
+            <ac:picMk id="4" creationId="{A4A04E26-1C2A-E616-E079-5DBD051C6B89}"/>
+          </ac:picMkLst>
+        </pc:picChg>
       </pc:sldChg>
     </pc:docChg>
   </pc:docChgLst>
@@ -1037,279 +1342,6 @@
       </pc:sldChg>
     </pc:docChg>
   </pc:docChgLst>
-  <pc:docChgLst>
-    <pc:chgData name="Bhushan Kolhe" userId="7436f0978ebcbfe7" providerId="LiveId" clId="{9082A401-8788-4009-A940-751ED403E6D2}"/>
-    <pc:docChg chg="undo custSel modSld">
-      <pc:chgData name="Bhushan Kolhe" userId="7436f0978ebcbfe7" providerId="LiveId" clId="{9082A401-8788-4009-A940-751ED403E6D2}" dt="2024-01-05T05:09:43.962" v="121" actId="14100"/>
-      <pc:docMkLst>
-        <pc:docMk/>
-      </pc:docMkLst>
-      <pc:sldChg chg="modSp mod">
-        <pc:chgData name="Bhushan Kolhe" userId="7436f0978ebcbfe7" providerId="LiveId" clId="{9082A401-8788-4009-A940-751ED403E6D2}" dt="2024-01-05T05:09:43.962" v="121" actId="14100"/>
-        <pc:sldMkLst>
-          <pc:docMk/>
-          <pc:sldMk cId="3842410494" sldId="258"/>
-        </pc:sldMkLst>
-        <pc:spChg chg="mod">
-          <ac:chgData name="Bhushan Kolhe" userId="7436f0978ebcbfe7" providerId="LiveId" clId="{9082A401-8788-4009-A940-751ED403E6D2}" dt="2024-01-05T05:09:43.962" v="121" actId="14100"/>
-          <ac:spMkLst>
-            <pc:docMk/>
-            <pc:sldMk cId="3842410494" sldId="258"/>
-            <ac:spMk id="7" creationId="{BB407EF5-5B04-BA34-7ADC-8B50E55C40A2}"/>
-          </ac:spMkLst>
-        </pc:spChg>
-      </pc:sldChg>
-      <pc:sldChg chg="addSp delSp modSp mod">
-        <pc:chgData name="Bhushan Kolhe" userId="7436f0978ebcbfe7" providerId="LiveId" clId="{9082A401-8788-4009-A940-751ED403E6D2}" dt="2024-01-05T05:08:48.213" v="120" actId="14100"/>
-        <pc:sldMkLst>
-          <pc:docMk/>
-          <pc:sldMk cId="4238390595" sldId="269"/>
-        </pc:sldMkLst>
-        <pc:spChg chg="add mod ord">
-          <ac:chgData name="Bhushan Kolhe" userId="7436f0978ebcbfe7" providerId="LiveId" clId="{9082A401-8788-4009-A940-751ED403E6D2}" dt="2024-01-05T05:08:22.323" v="114" actId="14100"/>
-          <ac:spMkLst>
-            <pc:docMk/>
-            <pc:sldMk cId="4238390595" sldId="269"/>
-            <ac:spMk id="2" creationId="{D21A3C8B-C2F5-C8C6-A305-9664F4313B05}"/>
-          </ac:spMkLst>
-        </pc:spChg>
-        <pc:spChg chg="mod ord">
-          <ac:chgData name="Bhushan Kolhe" userId="7436f0978ebcbfe7" providerId="LiveId" clId="{9082A401-8788-4009-A940-751ED403E6D2}" dt="2024-01-05T05:07:48.329" v="109" actId="465"/>
-          <ac:spMkLst>
-            <pc:docMk/>
-            <pc:sldMk cId="4238390595" sldId="269"/>
-            <ac:spMk id="3" creationId="{65ED055F-9699-9EC4-C2E8-2608924F4B0A}"/>
-          </ac:spMkLst>
-        </pc:spChg>
-        <pc:spChg chg="mod">
-          <ac:chgData name="Bhushan Kolhe" userId="7436f0978ebcbfe7" providerId="LiveId" clId="{9082A401-8788-4009-A940-751ED403E6D2}" dt="2024-01-05T05:07:44.457" v="108" actId="552"/>
-          <ac:spMkLst>
-            <pc:docMk/>
-            <pc:sldMk cId="4238390595" sldId="269"/>
-            <ac:spMk id="4" creationId="{3B1ACA4C-CE50-A8C7-6B2F-77B674DEE881}"/>
-          </ac:spMkLst>
-        </pc:spChg>
-        <pc:picChg chg="add del mod">
-          <ac:chgData name="Bhushan Kolhe" userId="7436f0978ebcbfe7" providerId="LiveId" clId="{9082A401-8788-4009-A940-751ED403E6D2}" dt="2024-01-05T04:56:48.563" v="2" actId="478"/>
-          <ac:picMkLst>
-            <pc:docMk/>
-            <pc:sldMk cId="4238390595" sldId="269"/>
-            <ac:picMk id="1026" creationId="{2F8B5B2F-94B5-BE5A-B8ED-7E910C1723FE}"/>
-          </ac:picMkLst>
-        </pc:picChg>
-        <pc:picChg chg="add mod">
-          <ac:chgData name="Bhushan Kolhe" userId="7436f0978ebcbfe7" providerId="LiveId" clId="{9082A401-8788-4009-A940-751ED403E6D2}" dt="2024-01-05T05:08:48.213" v="120" actId="14100"/>
-          <ac:picMkLst>
-            <pc:docMk/>
-            <pc:sldMk cId="4238390595" sldId="269"/>
-            <ac:picMk id="1028" creationId="{A0EF93C9-347D-B866-F8E8-7A8BBB516476}"/>
-          </ac:picMkLst>
-        </pc:picChg>
-      </pc:sldChg>
-    </pc:docChg>
-  </pc:docChgLst>
-  <pc:docChgLst>
-    <pc:chgData name="Bhushan Kolhe" userId="7436f0978ebcbfe7" providerId="LiveId" clId="{BD41A79C-C1D0-44EA-BE0B-5EFDCBA1CF78}"/>
-    <pc:docChg chg="undo custSel addSld modSld">
-      <pc:chgData name="Bhushan Kolhe" userId="7436f0978ebcbfe7" providerId="LiveId" clId="{BD41A79C-C1D0-44EA-BE0B-5EFDCBA1CF78}" dt="2024-01-05T08:19:56.231" v="311" actId="5793"/>
-      <pc:docMkLst>
-        <pc:docMk/>
-      </pc:docMkLst>
-      <pc:sldChg chg="modSp mod">
-        <pc:chgData name="Bhushan Kolhe" userId="7436f0978ebcbfe7" providerId="LiveId" clId="{BD41A79C-C1D0-44EA-BE0B-5EFDCBA1CF78}" dt="2024-01-05T08:16:54.047" v="273" actId="20577"/>
-        <pc:sldMkLst>
-          <pc:docMk/>
-          <pc:sldMk cId="2852237901" sldId="264"/>
-        </pc:sldMkLst>
-        <pc:spChg chg="mod">
-          <ac:chgData name="Bhushan Kolhe" userId="7436f0978ebcbfe7" providerId="LiveId" clId="{BD41A79C-C1D0-44EA-BE0B-5EFDCBA1CF78}" dt="2024-01-05T08:16:54.047" v="273" actId="20577"/>
-          <ac:spMkLst>
-            <pc:docMk/>
-            <pc:sldMk cId="2852237901" sldId="264"/>
-            <ac:spMk id="6" creationId="{19F7FF01-6754-BD8F-10DA-ADA7299F5369}"/>
-          </ac:spMkLst>
-        </pc:spChg>
-      </pc:sldChg>
-      <pc:sldChg chg="modSp mod">
-        <pc:chgData name="Bhushan Kolhe" userId="7436f0978ebcbfe7" providerId="LiveId" clId="{BD41A79C-C1D0-44EA-BE0B-5EFDCBA1CF78}" dt="2024-01-05T08:16:59.521" v="282" actId="20577"/>
-        <pc:sldMkLst>
-          <pc:docMk/>
-          <pc:sldMk cId="941089417" sldId="265"/>
-        </pc:sldMkLst>
-        <pc:spChg chg="mod">
-          <ac:chgData name="Bhushan Kolhe" userId="7436f0978ebcbfe7" providerId="LiveId" clId="{BD41A79C-C1D0-44EA-BE0B-5EFDCBA1CF78}" dt="2024-01-05T08:16:59.521" v="282" actId="20577"/>
-          <ac:spMkLst>
-            <pc:docMk/>
-            <pc:sldMk cId="941089417" sldId="265"/>
-            <ac:spMk id="6" creationId="{19F7FF01-6754-BD8F-10DA-ADA7299F5369}"/>
-          </ac:spMkLst>
-        </pc:spChg>
-      </pc:sldChg>
-      <pc:sldChg chg="modSp mod">
-        <pc:chgData name="Bhushan Kolhe" userId="7436f0978ebcbfe7" providerId="LiveId" clId="{BD41A79C-C1D0-44EA-BE0B-5EFDCBA1CF78}" dt="2024-01-05T08:16:25.725" v="264" actId="20577"/>
-        <pc:sldMkLst>
-          <pc:docMk/>
-          <pc:sldMk cId="737767209" sldId="268"/>
-        </pc:sldMkLst>
-        <pc:spChg chg="mod">
-          <ac:chgData name="Bhushan Kolhe" userId="7436f0978ebcbfe7" providerId="LiveId" clId="{BD41A79C-C1D0-44EA-BE0B-5EFDCBA1CF78}" dt="2024-01-05T08:16:25.725" v="264" actId="20577"/>
-          <ac:spMkLst>
-            <pc:docMk/>
-            <pc:sldMk cId="737767209" sldId="268"/>
-            <ac:spMk id="6" creationId="{19F7FF01-6754-BD8F-10DA-ADA7299F5369}"/>
-          </ac:spMkLst>
-        </pc:spChg>
-      </pc:sldChg>
-      <pc:sldChg chg="modSp mod">
-        <pc:chgData name="Bhushan Kolhe" userId="7436f0978ebcbfe7" providerId="LiveId" clId="{BD41A79C-C1D0-44EA-BE0B-5EFDCBA1CF78}" dt="2024-01-05T07:45:51.884" v="1" actId="113"/>
-        <pc:sldMkLst>
-          <pc:docMk/>
-          <pc:sldMk cId="4238390595" sldId="269"/>
-        </pc:sldMkLst>
-        <pc:spChg chg="mod">
-          <ac:chgData name="Bhushan Kolhe" userId="7436f0978ebcbfe7" providerId="LiveId" clId="{BD41A79C-C1D0-44EA-BE0B-5EFDCBA1CF78}" dt="2024-01-05T07:45:51.884" v="1" actId="113"/>
-          <ac:spMkLst>
-            <pc:docMk/>
-            <pc:sldMk cId="4238390595" sldId="269"/>
-            <ac:spMk id="4" creationId="{3B1ACA4C-CE50-A8C7-6B2F-77B674DEE881}"/>
-          </ac:spMkLst>
-        </pc:spChg>
-      </pc:sldChg>
-      <pc:sldChg chg="modSp mod">
-        <pc:chgData name="Bhushan Kolhe" userId="7436f0978ebcbfe7" providerId="LiveId" clId="{BD41A79C-C1D0-44EA-BE0B-5EFDCBA1CF78}" dt="2024-01-05T08:15:29.868" v="241" actId="20577"/>
-        <pc:sldMkLst>
-          <pc:docMk/>
-          <pc:sldMk cId="2938684696" sldId="272"/>
-        </pc:sldMkLst>
-        <pc:spChg chg="mod">
-          <ac:chgData name="Bhushan Kolhe" userId="7436f0978ebcbfe7" providerId="LiveId" clId="{BD41A79C-C1D0-44EA-BE0B-5EFDCBA1CF78}" dt="2024-01-05T08:15:29.868" v="241" actId="20577"/>
-          <ac:spMkLst>
-            <pc:docMk/>
-            <pc:sldMk cId="2938684696" sldId="272"/>
-            <ac:spMk id="6" creationId="{19F7FF01-6754-BD8F-10DA-ADA7299F5369}"/>
-          </ac:spMkLst>
-        </pc:spChg>
-      </pc:sldChg>
-      <pc:sldChg chg="addSp delSp modSp mod">
-        <pc:chgData name="Bhushan Kolhe" userId="7436f0978ebcbfe7" providerId="LiveId" clId="{BD41A79C-C1D0-44EA-BE0B-5EFDCBA1CF78}" dt="2024-01-05T08:19:01.926" v="309" actId="1076"/>
-        <pc:sldMkLst>
-          <pc:docMk/>
-          <pc:sldMk cId="1833194787" sldId="273"/>
-        </pc:sldMkLst>
-        <pc:spChg chg="mod">
-          <ac:chgData name="Bhushan Kolhe" userId="7436f0978ebcbfe7" providerId="LiveId" clId="{BD41A79C-C1D0-44EA-BE0B-5EFDCBA1CF78}" dt="2024-01-05T08:17:16.804" v="300" actId="20577"/>
-          <ac:spMkLst>
-            <pc:docMk/>
-            <pc:sldMk cId="1833194787" sldId="273"/>
-            <ac:spMk id="6" creationId="{19F7FF01-6754-BD8F-10DA-ADA7299F5369}"/>
-          </ac:spMkLst>
-        </pc:spChg>
-        <pc:spChg chg="mod">
-          <ac:chgData name="Bhushan Kolhe" userId="7436f0978ebcbfe7" providerId="LiveId" clId="{BD41A79C-C1D0-44EA-BE0B-5EFDCBA1CF78}" dt="2024-01-05T08:18:57.847" v="308" actId="1076"/>
-          <ac:spMkLst>
-            <pc:docMk/>
-            <pc:sldMk cId="1833194787" sldId="273"/>
-            <ac:spMk id="11" creationId="{BB407EF5-5B04-BA34-7ADC-8B50E55C40A2}"/>
-          </ac:spMkLst>
-        </pc:spChg>
-        <pc:picChg chg="del mod">
-          <ac:chgData name="Bhushan Kolhe" userId="7436f0978ebcbfe7" providerId="LiveId" clId="{BD41A79C-C1D0-44EA-BE0B-5EFDCBA1CF78}" dt="2024-01-05T08:18:30.074" v="301" actId="478"/>
-          <ac:picMkLst>
-            <pc:docMk/>
-            <pc:sldMk cId="1833194787" sldId="273"/>
-            <ac:picMk id="2" creationId="{45CA5A49-09E2-4213-1ADE-DFD54F65DB12}"/>
-          </ac:picMkLst>
-        </pc:picChg>
-        <pc:picChg chg="add mod">
-          <ac:chgData name="Bhushan Kolhe" userId="7436f0978ebcbfe7" providerId="LiveId" clId="{BD41A79C-C1D0-44EA-BE0B-5EFDCBA1CF78}" dt="2024-01-05T07:53:34.084" v="62" actId="1076"/>
-          <ac:picMkLst>
-            <pc:docMk/>
-            <pc:sldMk cId="1833194787" sldId="273"/>
-            <ac:picMk id="3" creationId="{BA0103DE-AF4B-98C6-68BE-9D7E38546A04}"/>
-          </ac:picMkLst>
-        </pc:picChg>
-        <pc:picChg chg="add mod">
-          <ac:chgData name="Bhushan Kolhe" userId="7436f0978ebcbfe7" providerId="LiveId" clId="{BD41A79C-C1D0-44EA-BE0B-5EFDCBA1CF78}" dt="2024-01-05T07:54:08.489" v="65" actId="1076"/>
-          <ac:picMkLst>
-            <pc:docMk/>
-            <pc:sldMk cId="1833194787" sldId="273"/>
-            <ac:picMk id="4" creationId="{A4A04E26-1C2A-E616-E079-5DBD051C6B89}"/>
-          </ac:picMkLst>
-        </pc:picChg>
-        <pc:picChg chg="add mod">
-          <ac:chgData name="Bhushan Kolhe" userId="7436f0978ebcbfe7" providerId="LiveId" clId="{BD41A79C-C1D0-44EA-BE0B-5EFDCBA1CF78}" dt="2024-01-05T08:19:01.926" v="309" actId="1076"/>
-          <ac:picMkLst>
-            <pc:docMk/>
-            <pc:sldMk cId="1833194787" sldId="273"/>
-            <ac:picMk id="7" creationId="{043AD7E5-06B1-B82B-7872-967F723106F7}"/>
-          </ac:picMkLst>
-        </pc:picChg>
-      </pc:sldChg>
-      <pc:sldChg chg="addSp delSp modSp add mod">
-        <pc:chgData name="Bhushan Kolhe" userId="7436f0978ebcbfe7" providerId="LiveId" clId="{BD41A79C-C1D0-44EA-BE0B-5EFDCBA1CF78}" dt="2024-01-05T08:19:56.231" v="311" actId="5793"/>
-        <pc:sldMkLst>
-          <pc:docMk/>
-          <pc:sldMk cId="3102868661" sldId="275"/>
-        </pc:sldMkLst>
-        <pc:spChg chg="add mod">
-          <ac:chgData name="Bhushan Kolhe" userId="7436f0978ebcbfe7" providerId="LiveId" clId="{BD41A79C-C1D0-44EA-BE0B-5EFDCBA1CF78}" dt="2024-01-05T08:14:45.763" v="231" actId="1076"/>
-          <ac:spMkLst>
-            <pc:docMk/>
-            <pc:sldMk cId="3102868661" sldId="275"/>
-            <ac:spMk id="5" creationId="{31192407-AC2C-C236-A138-BED7F6A836FA}"/>
-          </ac:spMkLst>
-        </pc:spChg>
-        <pc:spChg chg="mod">
-          <ac:chgData name="Bhushan Kolhe" userId="7436f0978ebcbfe7" providerId="LiveId" clId="{BD41A79C-C1D0-44EA-BE0B-5EFDCBA1CF78}" dt="2024-01-05T08:11:19.712" v="206" actId="20577"/>
-          <ac:spMkLst>
-            <pc:docMk/>
-            <pc:sldMk cId="3102868661" sldId="275"/>
-            <ac:spMk id="6" creationId="{19F7FF01-6754-BD8F-10DA-ADA7299F5369}"/>
-          </ac:spMkLst>
-        </pc:spChg>
-        <pc:spChg chg="add mod">
-          <ac:chgData name="Bhushan Kolhe" userId="7436f0978ebcbfe7" providerId="LiveId" clId="{BD41A79C-C1D0-44EA-BE0B-5EFDCBA1CF78}" dt="2024-01-05T08:19:56.231" v="311" actId="5793"/>
-          <ac:spMkLst>
-            <pc:docMk/>
-            <pc:sldMk cId="3102868661" sldId="275"/>
-            <ac:spMk id="7" creationId="{6EDDA372-85D3-026F-75D7-F0C7B0519F83}"/>
-          </ac:spMkLst>
-        </pc:spChg>
-        <pc:spChg chg="mod">
-          <ac:chgData name="Bhushan Kolhe" userId="7436f0978ebcbfe7" providerId="LiveId" clId="{BD41A79C-C1D0-44EA-BE0B-5EFDCBA1CF78}" dt="2024-01-05T08:03:18.914" v="112" actId="14100"/>
-          <ac:spMkLst>
-            <pc:docMk/>
-            <pc:sldMk cId="3102868661" sldId="275"/>
-            <ac:spMk id="11" creationId="{BB407EF5-5B04-BA34-7ADC-8B50E55C40A2}"/>
-          </ac:spMkLst>
-        </pc:spChg>
-        <pc:picChg chg="del">
-          <ac:chgData name="Bhushan Kolhe" userId="7436f0978ebcbfe7" providerId="LiveId" clId="{BD41A79C-C1D0-44EA-BE0B-5EFDCBA1CF78}" dt="2024-01-05T07:56:04.746" v="68" actId="478"/>
-          <ac:picMkLst>
-            <pc:docMk/>
-            <pc:sldMk cId="3102868661" sldId="275"/>
-            <ac:picMk id="2" creationId="{45CA5A49-09E2-4213-1ADE-DFD54F65DB12}"/>
-          </ac:picMkLst>
-        </pc:picChg>
-        <pc:picChg chg="del">
-          <ac:chgData name="Bhushan Kolhe" userId="7436f0978ebcbfe7" providerId="LiveId" clId="{BD41A79C-C1D0-44EA-BE0B-5EFDCBA1CF78}" dt="2024-01-05T07:56:05.506" v="69" actId="478"/>
-          <ac:picMkLst>
-            <pc:docMk/>
-            <pc:sldMk cId="3102868661" sldId="275"/>
-            <ac:picMk id="3" creationId="{BA0103DE-AF4B-98C6-68BE-9D7E38546A04}"/>
-          </ac:picMkLst>
-        </pc:picChg>
-        <pc:picChg chg="del">
-          <ac:chgData name="Bhushan Kolhe" userId="7436f0978ebcbfe7" providerId="LiveId" clId="{BD41A79C-C1D0-44EA-BE0B-5EFDCBA1CF78}" dt="2024-01-05T07:56:06.573" v="70" actId="478"/>
-          <ac:picMkLst>
-            <pc:docMk/>
-            <pc:sldMk cId="3102868661" sldId="275"/>
-            <ac:picMk id="4" creationId="{A4A04E26-1C2A-E616-E079-5DBD051C6B89}"/>
-          </ac:picMkLst>
-        </pc:picChg>
-      </pc:sldChg>
-    </pc:docChg>
-  </pc:docChgLst>
 </pc:chgInfo>
 </file>
 
@@ -1460,7 +1492,7 @@
           <a:p>
             <a:fld id="{A5A49524-8529-4524-8DEE-386306A0BC93}" type="datetimeFigureOut">
               <a:rPr lang="en-US" smtClean="0"/>
-              <a:t>1/12/2024</a:t>
+              <a:t>1/19/2024</a:t>
             </a:fld>
             <a:endParaRPr lang="en-US"/>
           </a:p>
@@ -1658,7 +1690,7 @@
           <a:p>
             <a:fld id="{A5A49524-8529-4524-8DEE-386306A0BC93}" type="datetimeFigureOut">
               <a:rPr lang="en-US" smtClean="0"/>
-              <a:t>1/12/2024</a:t>
+              <a:t>1/19/2024</a:t>
             </a:fld>
             <a:endParaRPr lang="en-US"/>
           </a:p>
@@ -1866,7 +1898,7 @@
           <a:p>
             <a:fld id="{A5A49524-8529-4524-8DEE-386306A0BC93}" type="datetimeFigureOut">
               <a:rPr lang="en-US" smtClean="0"/>
-              <a:t>1/12/2024</a:t>
+              <a:t>1/19/2024</a:t>
             </a:fld>
             <a:endParaRPr lang="en-US"/>
           </a:p>
@@ -2064,7 +2096,7 @@
           <a:p>
             <a:fld id="{A5A49524-8529-4524-8DEE-386306A0BC93}" type="datetimeFigureOut">
               <a:rPr lang="en-US" smtClean="0"/>
-              <a:t>1/12/2024</a:t>
+              <a:t>1/19/2024</a:t>
             </a:fld>
             <a:endParaRPr lang="en-US"/>
           </a:p>
@@ -2339,7 +2371,7 @@
           <a:p>
             <a:fld id="{A5A49524-8529-4524-8DEE-386306A0BC93}" type="datetimeFigureOut">
               <a:rPr lang="en-US" smtClean="0"/>
-              <a:t>1/12/2024</a:t>
+              <a:t>1/19/2024</a:t>
             </a:fld>
             <a:endParaRPr lang="en-US"/>
           </a:p>
@@ -2604,7 +2636,7 @@
           <a:p>
             <a:fld id="{A5A49524-8529-4524-8DEE-386306A0BC93}" type="datetimeFigureOut">
               <a:rPr lang="en-US" smtClean="0"/>
-              <a:t>1/12/2024</a:t>
+              <a:t>1/19/2024</a:t>
             </a:fld>
             <a:endParaRPr lang="en-US"/>
           </a:p>
@@ -3016,7 +3048,7 @@
           <a:p>
             <a:fld id="{A5A49524-8529-4524-8DEE-386306A0BC93}" type="datetimeFigureOut">
               <a:rPr lang="en-US" smtClean="0"/>
-              <a:t>1/12/2024</a:t>
+              <a:t>1/19/2024</a:t>
             </a:fld>
             <a:endParaRPr lang="en-US"/>
           </a:p>
@@ -3157,7 +3189,7 @@
           <a:p>
             <a:fld id="{A5A49524-8529-4524-8DEE-386306A0BC93}" type="datetimeFigureOut">
               <a:rPr lang="en-US" smtClean="0"/>
-              <a:t>1/12/2024</a:t>
+              <a:t>1/19/2024</a:t>
             </a:fld>
             <a:endParaRPr lang="en-US"/>
           </a:p>
@@ -3270,7 +3302,7 @@
           <a:p>
             <a:fld id="{A5A49524-8529-4524-8DEE-386306A0BC93}" type="datetimeFigureOut">
               <a:rPr lang="en-US" smtClean="0"/>
-              <a:t>1/12/2024</a:t>
+              <a:t>1/19/2024</a:t>
             </a:fld>
             <a:endParaRPr lang="en-US"/>
           </a:p>
@@ -3581,7 +3613,7 @@
           <a:p>
             <a:fld id="{A5A49524-8529-4524-8DEE-386306A0BC93}" type="datetimeFigureOut">
               <a:rPr lang="en-US" smtClean="0"/>
-              <a:t>1/12/2024</a:t>
+              <a:t>1/19/2024</a:t>
             </a:fld>
             <a:endParaRPr lang="en-US"/>
           </a:p>
@@ -3869,7 +3901,7 @@
           <a:p>
             <a:fld id="{A5A49524-8529-4524-8DEE-386306A0BC93}" type="datetimeFigureOut">
               <a:rPr lang="en-US" smtClean="0"/>
-              <a:t>1/12/2024</a:t>
+              <a:t>1/19/2024</a:t>
             </a:fld>
             <a:endParaRPr lang="en-US"/>
           </a:p>
@@ -4110,7 +4142,7 @@
           <a:p>
             <a:fld id="{A5A49524-8529-4524-8DEE-386306A0BC93}" type="datetimeFigureOut">
               <a:rPr lang="en-US" smtClean="0"/>
-              <a:t>1/12/2024</a:t>
+              <a:t>1/19/2024</a:t>
             </a:fld>
             <a:endParaRPr lang="en-US"/>
           </a:p>
@@ -7657,10 +7689,10 @@
       </p:pic>
       <p:pic>
         <p:nvPicPr>
-          <p:cNvPr id="7" name="Picture 6">
-            <a:extLst>
-              <a:ext uri="{FF2B5EF4-FFF2-40B4-BE49-F238E27FC236}">
-                <a16:creationId xmlns:a16="http://schemas.microsoft.com/office/drawing/2014/main" id="{043AD7E5-06B1-B82B-7872-967F723106F7}"/>
+          <p:cNvPr id="5" name="Picture 4">
+            <a:extLst>
+              <a:ext uri="{FF2B5EF4-FFF2-40B4-BE49-F238E27FC236}">
+                <a16:creationId xmlns:a16="http://schemas.microsoft.com/office/drawing/2014/main" id="{DEEEEA27-3DAC-ACBE-E116-87DB43C8FE16}"/>
               </a:ext>
             </a:extLst>
           </p:cNvPr>
@@ -7677,8 +7709,8 @@
         </p:blipFill>
         <p:spPr>
           <a:xfrm>
-            <a:off x="4659262" y="1461321"/>
-            <a:ext cx="6895988" cy="1638564"/>
+            <a:off x="4676096" y="1430921"/>
+            <a:ext cx="6887676" cy="1595216"/>
           </a:xfrm>
           <a:prstGeom prst="rect">
             <a:avLst/>

</xml_diff>